<commit_message>
Change the readme_title pic
</commit_message>
<xml_diff>
--- a/img/generator.pptx
+++ b/img/generator.pptx
@@ -3966,41 +3966,98 @@
           <a:chExt cx="0" cy="0"/>
         </a:xfrm>
       </p:grpSpPr>
-      <p:pic>
-        <p:nvPicPr>
-          <p:cNvPr id="3" name="Picture 2">
-            <a:extLst>
-              <a:ext uri="{FF2B5EF4-FFF2-40B4-BE49-F238E27FC236}">
-                <a16:creationId xmlns:a16="http://schemas.microsoft.com/office/drawing/2014/main" id="{6B8E780D-8D83-44B3-BBED-506555512E3E}"/>
-              </a:ext>
-            </a:extLst>
-          </p:cNvPr>
-          <p:cNvPicPr>
-            <a:picLocks noChangeAspect="1"/>
-          </p:cNvPicPr>
+      <p:grpSp>
+        <p:nvGrpSpPr>
+          <p:cNvPr id="5" name="Group 4">
+            <a:extLst>
+              <a:ext uri="{FF2B5EF4-FFF2-40B4-BE49-F238E27FC236}">
+                <a16:creationId xmlns:a16="http://schemas.microsoft.com/office/drawing/2014/main" id="{84E6AE24-A1A6-4AEF-B0A9-1B46149ABE15}"/>
+              </a:ext>
+            </a:extLst>
+          </p:cNvPr>
+          <p:cNvGrpSpPr/>
           <p:nvPr/>
-        </p:nvPicPr>
-        <p:blipFill rotWithShape="1">
-          <a:blip r:embed="rId2">
-            <a:extLst>
-              <a:ext uri="{28A0092B-C50C-407E-A947-70E740481C1C}">
-                <a14:useLocalDpi xmlns:a14="http://schemas.microsoft.com/office/drawing/2010/main" val="0"/>
-              </a:ext>
-            </a:extLst>
-          </a:blip>
-          <a:srcRect l="7854" r="4322"/>
-          <a:stretch/>
-        </p:blipFill>
-        <p:spPr>
+        </p:nvGrpSpPr>
+        <p:grpSpPr>
           <a:xfrm>
             <a:off x="1224366" y="1554317"/>
             <a:ext cx="10151390" cy="3749365"/>
+            <a:chOff x="1224366" y="1554317"/>
+            <a:chExt cx="10151390" cy="3749365"/>
           </a:xfrm>
-          <a:prstGeom prst="rect">
-            <a:avLst/>
-          </a:prstGeom>
-        </p:spPr>
-      </p:pic>
+        </p:grpSpPr>
+        <p:pic>
+          <p:nvPicPr>
+            <p:cNvPr id="3" name="Picture 2">
+              <a:extLst>
+                <a:ext uri="{FF2B5EF4-FFF2-40B4-BE49-F238E27FC236}">
+                  <a16:creationId xmlns:a16="http://schemas.microsoft.com/office/drawing/2014/main" id="{6B8E780D-8D83-44B3-BBED-506555512E3E}"/>
+                </a:ext>
+              </a:extLst>
+            </p:cNvPr>
+            <p:cNvPicPr>
+              <a:picLocks noChangeAspect="1"/>
+            </p:cNvPicPr>
+            <p:nvPr/>
+          </p:nvPicPr>
+          <p:blipFill rotWithShape="1">
+            <a:blip r:embed="rId2">
+              <a:extLst>
+                <a:ext uri="{28A0092B-C50C-407E-A947-70E740481C1C}">
+                  <a14:useLocalDpi xmlns:a14="http://schemas.microsoft.com/office/drawing/2010/main" val="0"/>
+                </a:ext>
+              </a:extLst>
+            </a:blip>
+            <a:srcRect l="7854" r="4322"/>
+            <a:stretch/>
+          </p:blipFill>
+          <p:spPr>
+            <a:xfrm>
+              <a:off x="1224366" y="1554317"/>
+              <a:ext cx="10151390" cy="3749365"/>
+            </a:xfrm>
+            <a:prstGeom prst="rect">
+              <a:avLst/>
+            </a:prstGeom>
+          </p:spPr>
+        </p:pic>
+        <p:pic>
+          <p:nvPicPr>
+            <p:cNvPr id="4" name="Picture 3">
+              <a:extLst>
+                <a:ext uri="{FF2B5EF4-FFF2-40B4-BE49-F238E27FC236}">
+                  <a16:creationId xmlns:a16="http://schemas.microsoft.com/office/drawing/2014/main" id="{339CE24A-2EE5-4774-B9F7-8F274AE50CB7}"/>
+                </a:ext>
+              </a:extLst>
+            </p:cNvPr>
+            <p:cNvPicPr>
+              <a:picLocks noChangeAspect="1"/>
+            </p:cNvPicPr>
+            <p:nvPr/>
+          </p:nvPicPr>
+          <p:blipFill>
+            <a:blip r:embed="rId3">
+              <a:extLst>
+                <a:ext uri="{28A0092B-C50C-407E-A947-70E740481C1C}">
+                  <a14:useLocalDpi xmlns:a14="http://schemas.microsoft.com/office/drawing/2010/main" val="0"/>
+                </a:ext>
+              </a:extLst>
+            </a:blip>
+            <a:stretch>
+              <a:fillRect/>
+            </a:stretch>
+          </p:blipFill>
+          <p:spPr>
+            <a:xfrm>
+              <a:off x="9994616" y="4523488"/>
+              <a:ext cx="1217335" cy="667652"/>
+            </a:xfrm>
+            <a:prstGeom prst="rect">
+              <a:avLst/>
+            </a:prstGeom>
+          </p:spPr>
+        </p:pic>
+      </p:grpSp>
     </p:spTree>
     <p:extLst>
       <p:ext uri="{BB962C8B-B14F-4D97-AF65-F5344CB8AC3E}">

</xml_diff>